<commit_message>
Fixed bugs and added enhancements including Excel Upgrades,new features etc. in this commit
</commit_message>
<xml_diff>
--- a/Automatic TA Assignment.pptx
+++ b/Automatic TA Assignment.pptx
@@ -276,7 +276,7 @@
       </p:grpSpPr>
       <p:sp>
         <p:nvSpPr>
-          <p:cNvPr id="3" name="Shape 3"/>
+          <p:cNvPr id="3" name="Google Shape;3;n"/>
           <p:cNvSpPr/>
           <p:nvPr>
             <p:ph idx="2" type="sldImg"/>
@@ -288,6 +288,7 @@
             <a:ext cx="6096075" cy="3429000"/>
           </a:xfrm>
           <a:custGeom>
+            <a:rect b="b" l="l" r="r" t="t"/>
             <a:pathLst>
               <a:path extrusionOk="0" h="120000" w="120000">
                 <a:moveTo>
@@ -320,7 +321,7 @@
       </p:sp>
       <p:sp>
         <p:nvSpPr>
-          <p:cNvPr id="4" name="Shape 4"/>
+          <p:cNvPr id="4" name="Google Shape;4;n"/>
           <p:cNvSpPr txBox="1"/>
           <p:nvPr>
             <p:ph idx="1" type="body"/>
@@ -699,7 +700,7 @@
       </p:grpSpPr>
       <p:sp>
         <p:nvSpPr>
-          <p:cNvPr id="51" name="Shape 51"/>
+          <p:cNvPr id="51" name="Google Shape;51;gc6f90357f_0_0:notes"/>
           <p:cNvSpPr/>
           <p:nvPr>
             <p:ph idx="2" type="sldImg"/>
@@ -711,6 +712,7 @@
             <a:ext cx="6096300" cy="3429000"/>
           </a:xfrm>
           <a:custGeom>
+            <a:rect b="b" l="l" r="r" t="t"/>
             <a:pathLst>
               <a:path extrusionOk="0" h="120000" w="120000">
                 <a:moveTo>
@@ -733,7 +735,7 @@
       </p:sp>
       <p:sp>
         <p:nvSpPr>
-          <p:cNvPr id="52" name="Shape 52"/>
+          <p:cNvPr id="52" name="Google Shape;52;gc6f90357f_0_0:notes"/>
           <p:cNvSpPr txBox="1"/>
           <p:nvPr>
             <p:ph idx="1" type="body"/>
@@ -754,7 +756,7 @@
           </a:bodyPr>
           <a:lstStyle/>
           <a:p>
-            <a:pPr indent="0" lvl="0" marL="0">
+            <a:pPr indent="0" lvl="0" marL="0" rtl="0" algn="l">
               <a:spcBef>
                 <a:spcPts val="0"/>
               </a:spcBef>
@@ -797,7 +799,7 @@
       </p:grpSpPr>
       <p:sp>
         <p:nvSpPr>
-          <p:cNvPr id="101" name="Shape 101"/>
+          <p:cNvPr id="101" name="Google Shape;101;g2c97aaff3d_0_7:notes"/>
           <p:cNvSpPr/>
           <p:nvPr>
             <p:ph idx="2" type="sldImg"/>
@@ -809,6 +811,7 @@
             <a:ext cx="6096000" cy="3429000"/>
           </a:xfrm>
           <a:custGeom>
+            <a:rect b="b" l="l" r="r" t="t"/>
             <a:pathLst>
               <a:path extrusionOk="0" h="120000" w="120000">
                 <a:moveTo>
@@ -831,7 +834,7 @@
       </p:sp>
       <p:sp>
         <p:nvSpPr>
-          <p:cNvPr id="102" name="Shape 102"/>
+          <p:cNvPr id="102" name="Google Shape;102;g2c97aaff3d_0_7:notes"/>
           <p:cNvSpPr txBox="1"/>
           <p:nvPr>
             <p:ph idx="1" type="body"/>
@@ -852,7 +855,7 @@
           </a:bodyPr>
           <a:lstStyle/>
           <a:p>
-            <a:pPr indent="0" lvl="0" marL="0">
+            <a:pPr indent="0" lvl="0" marL="0" rtl="0" algn="l">
               <a:spcBef>
                 <a:spcPts val="0"/>
               </a:spcBef>
@@ -895,7 +898,7 @@
       </p:grpSpPr>
       <p:sp>
         <p:nvSpPr>
-          <p:cNvPr id="108" name="Shape 108"/>
+          <p:cNvPr id="108" name="Google Shape;108;gc6f90357f_0_47:notes"/>
           <p:cNvSpPr/>
           <p:nvPr>
             <p:ph idx="2" type="sldImg"/>
@@ -907,6 +910,7 @@
             <a:ext cx="6096300" cy="3429000"/>
           </a:xfrm>
           <a:custGeom>
+            <a:rect b="b" l="l" r="r" t="t"/>
             <a:pathLst>
               <a:path extrusionOk="0" h="120000" w="120000">
                 <a:moveTo>
@@ -929,7 +933,7 @@
       </p:sp>
       <p:sp>
         <p:nvSpPr>
-          <p:cNvPr id="109" name="Shape 109"/>
+          <p:cNvPr id="109" name="Google Shape;109;gc6f90357f_0_47:notes"/>
           <p:cNvSpPr txBox="1"/>
           <p:nvPr>
             <p:ph idx="1" type="body"/>
@@ -950,7 +954,7 @@
           </a:bodyPr>
           <a:lstStyle/>
           <a:p>
-            <a:pPr indent="0" lvl="0" marL="0" rtl="0">
+            <a:pPr indent="0" lvl="0" marL="0" rtl="0" algn="l">
               <a:spcBef>
                 <a:spcPts val="0"/>
               </a:spcBef>
@@ -993,7 +997,7 @@
       </p:grpSpPr>
       <p:sp>
         <p:nvSpPr>
-          <p:cNvPr id="114" name="Shape 114"/>
+          <p:cNvPr id="114" name="Google Shape;114;g2c97aaff3d_0_13:notes"/>
           <p:cNvSpPr/>
           <p:nvPr>
             <p:ph idx="2" type="sldImg"/>
@@ -1005,6 +1009,7 @@
             <a:ext cx="6096000" cy="3429000"/>
           </a:xfrm>
           <a:custGeom>
+            <a:rect b="b" l="l" r="r" t="t"/>
             <a:pathLst>
               <a:path extrusionOk="0" h="120000" w="120000">
                 <a:moveTo>
@@ -1027,7 +1032,7 @@
       </p:sp>
       <p:sp>
         <p:nvSpPr>
-          <p:cNvPr id="115" name="Shape 115"/>
+          <p:cNvPr id="115" name="Google Shape;115;g2c97aaff3d_0_13:notes"/>
           <p:cNvSpPr txBox="1"/>
           <p:nvPr>
             <p:ph idx="1" type="body"/>
@@ -1048,7 +1053,7 @@
           </a:bodyPr>
           <a:lstStyle/>
           <a:p>
-            <a:pPr indent="0" lvl="0" marL="0">
+            <a:pPr indent="0" lvl="0" marL="0" rtl="0" algn="l">
               <a:spcBef>
                 <a:spcPts val="0"/>
               </a:spcBef>
@@ -1091,7 +1096,7 @@
       </p:grpSpPr>
       <p:sp>
         <p:nvSpPr>
-          <p:cNvPr id="120" name="Shape 120"/>
+          <p:cNvPr id="120" name="Google Shape;120;g2c97aaff3d_0_18:notes"/>
           <p:cNvSpPr/>
           <p:nvPr>
             <p:ph idx="2" type="sldImg"/>
@@ -1103,6 +1108,7 @@
             <a:ext cx="6096000" cy="3429000"/>
           </a:xfrm>
           <a:custGeom>
+            <a:rect b="b" l="l" r="r" t="t"/>
             <a:pathLst>
               <a:path extrusionOk="0" h="120000" w="120000">
                 <a:moveTo>
@@ -1125,7 +1131,7 @@
       </p:sp>
       <p:sp>
         <p:nvSpPr>
-          <p:cNvPr id="121" name="Shape 121"/>
+          <p:cNvPr id="121" name="Google Shape;121;g2c97aaff3d_0_18:notes"/>
           <p:cNvSpPr txBox="1"/>
           <p:nvPr>
             <p:ph idx="1" type="body"/>
@@ -1146,7 +1152,7 @@
           </a:bodyPr>
           <a:lstStyle/>
           <a:p>
-            <a:pPr indent="0" lvl="0" marL="0">
+            <a:pPr indent="0" lvl="0" marL="0" rtl="0" algn="l">
               <a:spcBef>
                 <a:spcPts val="0"/>
               </a:spcBef>
@@ -1189,7 +1195,7 @@
       </p:grpSpPr>
       <p:sp>
         <p:nvSpPr>
-          <p:cNvPr id="126" name="Shape 126"/>
+          <p:cNvPr id="126" name="Google Shape;126;g2c97aaff3d_0_23:notes"/>
           <p:cNvSpPr/>
           <p:nvPr>
             <p:ph idx="2" type="sldImg"/>
@@ -1201,6 +1207,7 @@
             <a:ext cx="6096000" cy="3429000"/>
           </a:xfrm>
           <a:custGeom>
+            <a:rect b="b" l="l" r="r" t="t"/>
             <a:pathLst>
               <a:path extrusionOk="0" h="120000" w="120000">
                 <a:moveTo>
@@ -1223,7 +1230,7 @@
       </p:sp>
       <p:sp>
         <p:nvSpPr>
-          <p:cNvPr id="127" name="Shape 127"/>
+          <p:cNvPr id="127" name="Google Shape;127;g2c97aaff3d_0_23:notes"/>
           <p:cNvSpPr txBox="1"/>
           <p:nvPr>
             <p:ph idx="1" type="body"/>
@@ -1244,7 +1251,7 @@
           </a:bodyPr>
           <a:lstStyle/>
           <a:p>
-            <a:pPr indent="0" lvl="0" marL="0">
+            <a:pPr indent="0" lvl="0" marL="0" rtl="0" algn="l">
               <a:spcBef>
                 <a:spcPts val="0"/>
               </a:spcBef>
@@ -1287,7 +1294,7 @@
       </p:grpSpPr>
       <p:sp>
         <p:nvSpPr>
-          <p:cNvPr id="57" name="Shape 57"/>
+          <p:cNvPr id="57" name="Google Shape;57;gc6f90357f_0_5:notes"/>
           <p:cNvSpPr/>
           <p:nvPr>
             <p:ph idx="2" type="sldImg"/>
@@ -1299,6 +1306,7 @@
             <a:ext cx="6096300" cy="3429000"/>
           </a:xfrm>
           <a:custGeom>
+            <a:rect b="b" l="l" r="r" t="t"/>
             <a:pathLst>
               <a:path extrusionOk="0" h="120000" w="120000">
                 <a:moveTo>
@@ -1321,7 +1329,7 @@
       </p:sp>
       <p:sp>
         <p:nvSpPr>
-          <p:cNvPr id="58" name="Shape 58"/>
+          <p:cNvPr id="58" name="Google Shape;58;gc6f90357f_0_5:notes"/>
           <p:cNvSpPr txBox="1"/>
           <p:nvPr>
             <p:ph idx="1" type="body"/>
@@ -1342,7 +1350,7 @@
           </a:bodyPr>
           <a:lstStyle/>
           <a:p>
-            <a:pPr indent="0" lvl="0" marL="0">
+            <a:pPr indent="0" lvl="0" marL="0" rtl="0" algn="l">
               <a:spcBef>
                 <a:spcPts val="0"/>
               </a:spcBef>
@@ -1385,7 +1393,7 @@
       </p:grpSpPr>
       <p:sp>
         <p:nvSpPr>
-          <p:cNvPr id="63" name="Shape 63"/>
+          <p:cNvPr id="63" name="Google Shape;63;g2c97aaff3d_1_333:notes"/>
           <p:cNvSpPr/>
           <p:nvPr>
             <p:ph idx="2" type="sldImg"/>
@@ -1397,6 +1405,7 @@
             <a:ext cx="6096000" cy="3429000"/>
           </a:xfrm>
           <a:custGeom>
+            <a:rect b="b" l="l" r="r" t="t"/>
             <a:pathLst>
               <a:path extrusionOk="0" h="120000" w="120000">
                 <a:moveTo>
@@ -1419,7 +1428,7 @@
       </p:sp>
       <p:sp>
         <p:nvSpPr>
-          <p:cNvPr id="64" name="Shape 64"/>
+          <p:cNvPr id="64" name="Google Shape;64;g2c97aaff3d_1_333:notes"/>
           <p:cNvSpPr txBox="1"/>
           <p:nvPr>
             <p:ph idx="1" type="body"/>
@@ -1440,7 +1449,7 @@
           </a:bodyPr>
           <a:lstStyle/>
           <a:p>
-            <a:pPr indent="0" lvl="0" marL="0">
+            <a:pPr indent="0" lvl="0" marL="0" rtl="0" algn="l">
               <a:spcBef>
                 <a:spcPts val="0"/>
               </a:spcBef>
@@ -1483,7 +1492,7 @@
       </p:grpSpPr>
       <p:sp>
         <p:nvSpPr>
-          <p:cNvPr id="71" name="Shape 71"/>
+          <p:cNvPr id="71" name="Google Shape;71;g2c97aaff3d_1_658:notes"/>
           <p:cNvSpPr/>
           <p:nvPr>
             <p:ph idx="2" type="sldImg"/>
@@ -1495,6 +1504,7 @@
             <a:ext cx="6096000" cy="3429000"/>
           </a:xfrm>
           <a:custGeom>
+            <a:rect b="b" l="l" r="r" t="t"/>
             <a:pathLst>
               <a:path extrusionOk="0" h="120000" w="120000">
                 <a:moveTo>
@@ -1517,7 +1527,7 @@
       </p:sp>
       <p:sp>
         <p:nvSpPr>
-          <p:cNvPr id="72" name="Shape 72"/>
+          <p:cNvPr id="72" name="Google Shape;72;g2c97aaff3d_1_658:notes"/>
           <p:cNvSpPr txBox="1"/>
           <p:nvPr>
             <p:ph idx="1" type="body"/>
@@ -1538,7 +1548,7 @@
           </a:bodyPr>
           <a:lstStyle/>
           <a:p>
-            <a:pPr indent="0" lvl="0" marL="0">
+            <a:pPr indent="0" lvl="0" marL="0" rtl="0" algn="l">
               <a:spcBef>
                 <a:spcPts val="0"/>
               </a:spcBef>
@@ -1581,7 +1591,7 @@
       </p:grpSpPr>
       <p:sp>
         <p:nvSpPr>
-          <p:cNvPr id="76" name="Shape 76"/>
+          <p:cNvPr id="76" name="Google Shape;76;g2c97aaff3d_1_663:notes"/>
           <p:cNvSpPr/>
           <p:nvPr>
             <p:ph idx="2" type="sldImg"/>
@@ -1593,6 +1603,7 @@
             <a:ext cx="6096000" cy="3429000"/>
           </a:xfrm>
           <a:custGeom>
+            <a:rect b="b" l="l" r="r" t="t"/>
             <a:pathLst>
               <a:path extrusionOk="0" h="120000" w="120000">
                 <a:moveTo>
@@ -1615,7 +1626,7 @@
       </p:sp>
       <p:sp>
         <p:nvSpPr>
-          <p:cNvPr id="77" name="Shape 77"/>
+          <p:cNvPr id="77" name="Google Shape;77;g2c97aaff3d_1_663:notes"/>
           <p:cNvSpPr txBox="1"/>
           <p:nvPr>
             <p:ph idx="1" type="body"/>
@@ -1636,7 +1647,7 @@
           </a:bodyPr>
           <a:lstStyle/>
           <a:p>
-            <a:pPr indent="0" lvl="0" marL="0">
+            <a:pPr indent="0" lvl="0" marL="0" rtl="0" algn="l">
               <a:spcBef>
                 <a:spcPts val="0"/>
               </a:spcBef>
@@ -1679,7 +1690,7 @@
       </p:grpSpPr>
       <p:sp>
         <p:nvSpPr>
-          <p:cNvPr id="81" name="Shape 81"/>
+          <p:cNvPr id="81" name="Google Shape;81;g2c97aaff3d_1_668:notes"/>
           <p:cNvSpPr/>
           <p:nvPr>
             <p:ph idx="2" type="sldImg"/>
@@ -1691,6 +1702,7 @@
             <a:ext cx="6096000" cy="3429000"/>
           </a:xfrm>
           <a:custGeom>
+            <a:rect b="b" l="l" r="r" t="t"/>
             <a:pathLst>
               <a:path extrusionOk="0" h="120000" w="120000">
                 <a:moveTo>
@@ -1713,7 +1725,7 @@
       </p:sp>
       <p:sp>
         <p:nvSpPr>
-          <p:cNvPr id="82" name="Shape 82"/>
+          <p:cNvPr id="82" name="Google Shape;82;g2c97aaff3d_1_668:notes"/>
           <p:cNvSpPr txBox="1"/>
           <p:nvPr>
             <p:ph idx="1" type="body"/>
@@ -1734,7 +1746,7 @@
           </a:bodyPr>
           <a:lstStyle/>
           <a:p>
-            <a:pPr indent="0" lvl="0" marL="0">
+            <a:pPr indent="0" lvl="0" marL="0" rtl="0" algn="l">
               <a:spcBef>
                 <a:spcPts val="0"/>
               </a:spcBef>
@@ -1777,7 +1789,7 @@
       </p:grpSpPr>
       <p:sp>
         <p:nvSpPr>
-          <p:cNvPr id="86" name="Shape 86"/>
+          <p:cNvPr id="86" name="Google Shape;86;g2c97aaff3d_1_673:notes"/>
           <p:cNvSpPr/>
           <p:nvPr>
             <p:ph idx="2" type="sldImg"/>
@@ -1789,6 +1801,7 @@
             <a:ext cx="6096000" cy="3429000"/>
           </a:xfrm>
           <a:custGeom>
+            <a:rect b="b" l="l" r="r" t="t"/>
             <a:pathLst>
               <a:path extrusionOk="0" h="120000" w="120000">
                 <a:moveTo>
@@ -1811,7 +1824,7 @@
       </p:sp>
       <p:sp>
         <p:nvSpPr>
-          <p:cNvPr id="87" name="Shape 87"/>
+          <p:cNvPr id="87" name="Google Shape;87;g2c97aaff3d_1_673:notes"/>
           <p:cNvSpPr txBox="1"/>
           <p:nvPr>
             <p:ph idx="1" type="body"/>
@@ -1832,7 +1845,7 @@
           </a:bodyPr>
           <a:lstStyle/>
           <a:p>
-            <a:pPr indent="0" lvl="0" marL="0">
+            <a:pPr indent="0" lvl="0" marL="0" rtl="0" algn="l">
               <a:spcBef>
                 <a:spcPts val="0"/>
               </a:spcBef>
@@ -1875,7 +1888,7 @@
       </p:grpSpPr>
       <p:sp>
         <p:nvSpPr>
-          <p:cNvPr id="91" name="Shape 91"/>
+          <p:cNvPr id="91" name="Google Shape;91;g2c97aaff3d_1_679:notes"/>
           <p:cNvSpPr/>
           <p:nvPr>
             <p:ph idx="2" type="sldImg"/>
@@ -1887,6 +1900,7 @@
             <a:ext cx="6096000" cy="3429000"/>
           </a:xfrm>
           <a:custGeom>
+            <a:rect b="b" l="l" r="r" t="t"/>
             <a:pathLst>
               <a:path extrusionOk="0" h="120000" w="120000">
                 <a:moveTo>
@@ -1909,7 +1923,7 @@
       </p:sp>
       <p:sp>
         <p:nvSpPr>
-          <p:cNvPr id="92" name="Shape 92"/>
+          <p:cNvPr id="92" name="Google Shape;92;g2c97aaff3d_1_679:notes"/>
           <p:cNvSpPr txBox="1"/>
           <p:nvPr>
             <p:ph idx="1" type="body"/>
@@ -1930,7 +1944,7 @@
           </a:bodyPr>
           <a:lstStyle/>
           <a:p>
-            <a:pPr indent="0" lvl="0" marL="0">
+            <a:pPr indent="0" lvl="0" marL="0" rtl="0" algn="l">
               <a:spcBef>
                 <a:spcPts val="0"/>
               </a:spcBef>
@@ -1973,7 +1987,7 @@
       </p:grpSpPr>
       <p:sp>
         <p:nvSpPr>
-          <p:cNvPr id="96" name="Shape 96"/>
+          <p:cNvPr id="96" name="Google Shape;96;g2c97aaff3d_1_683:notes"/>
           <p:cNvSpPr/>
           <p:nvPr>
             <p:ph idx="2" type="sldImg"/>
@@ -1985,6 +1999,7 @@
             <a:ext cx="6096000" cy="3429000"/>
           </a:xfrm>
           <a:custGeom>
+            <a:rect b="b" l="l" r="r" t="t"/>
             <a:pathLst>
               <a:path extrusionOk="0" h="120000" w="120000">
                 <a:moveTo>
@@ -2007,7 +2022,7 @@
       </p:sp>
       <p:sp>
         <p:nvSpPr>
-          <p:cNvPr id="97" name="Shape 97"/>
+          <p:cNvPr id="97" name="Google Shape;97;g2c97aaff3d_1_683:notes"/>
           <p:cNvSpPr txBox="1"/>
           <p:nvPr>
             <p:ph idx="1" type="body"/>
@@ -2028,7 +2043,7 @@
           </a:bodyPr>
           <a:lstStyle/>
           <a:p>
-            <a:pPr indent="0" lvl="0" marL="0">
+            <a:pPr indent="0" lvl="0" marL="0" rtl="0" algn="l">
               <a:spcBef>
                 <a:spcPts val="0"/>
               </a:spcBef>
@@ -2071,7 +2086,7 @@
       </p:grpSpPr>
       <p:sp>
         <p:nvSpPr>
-          <p:cNvPr id="10" name="Shape 10"/>
+          <p:cNvPr id="10" name="Google Shape;10;p2"/>
           <p:cNvSpPr txBox="1"/>
           <p:nvPr>
             <p:ph type="ctrTitle"/>
@@ -2194,7 +2209,7 @@
       </p:sp>
       <p:sp>
         <p:nvSpPr>
-          <p:cNvPr id="11" name="Shape 11"/>
+          <p:cNvPr id="11" name="Google Shape;11;p2"/>
           <p:cNvSpPr txBox="1"/>
           <p:nvPr>
             <p:ph idx="1" type="subTitle"/>
@@ -2344,7 +2359,7 @@
       </p:sp>
       <p:sp>
         <p:nvSpPr>
-          <p:cNvPr id="12" name="Shape 12"/>
+          <p:cNvPr id="12" name="Google Shape;12;p2"/>
           <p:cNvSpPr txBox="1"/>
           <p:nvPr>
             <p:ph idx="12" type="sldNum"/>
@@ -2402,7 +2417,7 @@
             </a:lvl9pPr>
           </a:lstStyle>
           <a:p>
-            <a:pPr indent="0" lvl="0" marL="0">
+            <a:pPr indent="0" lvl="0" marL="0" rtl="0" algn="r">
               <a:spcBef>
                 <a:spcPts val="0"/>
               </a:spcBef>
@@ -2446,7 +2461,7 @@
       </p:grpSpPr>
       <p:sp>
         <p:nvSpPr>
-          <p:cNvPr id="45" name="Shape 45"/>
+          <p:cNvPr id="45" name="Google Shape;45;p11"/>
           <p:cNvSpPr txBox="1"/>
           <p:nvPr>
             <p:ph hasCustomPrompt="1" type="title"/>
@@ -2573,7 +2588,7 @@
       </p:sp>
       <p:sp>
         <p:nvSpPr>
-          <p:cNvPr id="46" name="Shape 46"/>
+          <p:cNvPr id="46" name="Google Shape;46;p11"/>
           <p:cNvSpPr txBox="1"/>
           <p:nvPr>
             <p:ph idx="1" type="body"/>
@@ -2696,7 +2711,7 @@
       </p:sp>
       <p:sp>
         <p:nvSpPr>
-          <p:cNvPr id="47" name="Shape 47"/>
+          <p:cNvPr id="47" name="Google Shape;47;p11"/>
           <p:cNvSpPr txBox="1"/>
           <p:nvPr>
             <p:ph idx="12" type="sldNum"/>
@@ -2754,7 +2769,7 @@
             </a:lvl9pPr>
           </a:lstStyle>
           <a:p>
-            <a:pPr indent="0" lvl="0" marL="0">
+            <a:pPr indent="0" lvl="0" marL="0" rtl="0" algn="r">
               <a:spcBef>
                 <a:spcPts val="0"/>
               </a:spcBef>
@@ -2798,7 +2813,7 @@
       </p:grpSpPr>
       <p:sp>
         <p:nvSpPr>
-          <p:cNvPr id="49" name="Shape 49"/>
+          <p:cNvPr id="49" name="Google Shape;49;p12"/>
           <p:cNvSpPr txBox="1"/>
           <p:nvPr>
             <p:ph idx="12" type="sldNum"/>
@@ -2856,7 +2871,7 @@
             </a:lvl9pPr>
           </a:lstStyle>
           <a:p>
-            <a:pPr indent="0" lvl="0" marL="0">
+            <a:pPr indent="0" lvl="0" marL="0" rtl="0" algn="r">
               <a:spcBef>
                 <a:spcPts val="0"/>
               </a:spcBef>
@@ -2900,7 +2915,7 @@
       </p:grpSpPr>
       <p:sp>
         <p:nvSpPr>
-          <p:cNvPr id="14" name="Shape 14"/>
+          <p:cNvPr id="14" name="Google Shape;14;p3"/>
           <p:cNvSpPr txBox="1"/>
           <p:nvPr>
             <p:ph type="title"/>
@@ -3023,7 +3038,7 @@
       </p:sp>
       <p:sp>
         <p:nvSpPr>
-          <p:cNvPr id="15" name="Shape 15"/>
+          <p:cNvPr id="15" name="Google Shape;15;p3"/>
           <p:cNvSpPr txBox="1"/>
           <p:nvPr>
             <p:ph idx="12" type="sldNum"/>
@@ -3081,7 +3096,7 @@
             </a:lvl9pPr>
           </a:lstStyle>
           <a:p>
-            <a:pPr indent="0" lvl="0" marL="0">
+            <a:pPr indent="0" lvl="0" marL="0" rtl="0" algn="r">
               <a:spcBef>
                 <a:spcPts val="0"/>
               </a:spcBef>
@@ -3125,7 +3140,7 @@
       </p:grpSpPr>
       <p:sp>
         <p:nvSpPr>
-          <p:cNvPr id="17" name="Shape 17"/>
+          <p:cNvPr id="17" name="Google Shape;17;p4"/>
           <p:cNvSpPr txBox="1"/>
           <p:nvPr>
             <p:ph type="title"/>
@@ -3248,7 +3263,7 @@
       </p:sp>
       <p:sp>
         <p:nvSpPr>
-          <p:cNvPr id="18" name="Shape 18"/>
+          <p:cNvPr id="18" name="Google Shape;18;p4"/>
           <p:cNvSpPr txBox="1"/>
           <p:nvPr>
             <p:ph idx="1" type="body"/>
@@ -3371,7 +3386,7 @@
       </p:sp>
       <p:sp>
         <p:nvSpPr>
-          <p:cNvPr id="19" name="Shape 19"/>
+          <p:cNvPr id="19" name="Google Shape;19;p4"/>
           <p:cNvSpPr txBox="1"/>
           <p:nvPr>
             <p:ph idx="12" type="sldNum"/>
@@ -3429,7 +3444,7 @@
             </a:lvl9pPr>
           </a:lstStyle>
           <a:p>
-            <a:pPr indent="0" lvl="0" marL="0">
+            <a:pPr indent="0" lvl="0" marL="0" rtl="0" algn="r">
               <a:spcBef>
                 <a:spcPts val="0"/>
               </a:spcBef>
@@ -3473,7 +3488,7 @@
       </p:grpSpPr>
       <p:sp>
         <p:nvSpPr>
-          <p:cNvPr id="21" name="Shape 21"/>
+          <p:cNvPr id="21" name="Google Shape;21;p5"/>
           <p:cNvSpPr txBox="1"/>
           <p:nvPr>
             <p:ph type="title"/>
@@ -3596,7 +3611,7 @@
       </p:sp>
       <p:sp>
         <p:nvSpPr>
-          <p:cNvPr id="22" name="Shape 22"/>
+          <p:cNvPr id="22" name="Google Shape;22;p5"/>
           <p:cNvSpPr txBox="1"/>
           <p:nvPr>
             <p:ph idx="1" type="body"/>
@@ -3719,7 +3734,7 @@
       </p:sp>
       <p:sp>
         <p:nvSpPr>
-          <p:cNvPr id="23" name="Shape 23"/>
+          <p:cNvPr id="23" name="Google Shape;23;p5"/>
           <p:cNvSpPr txBox="1"/>
           <p:nvPr>
             <p:ph idx="2" type="body"/>
@@ -3842,7 +3857,7 @@
       </p:sp>
       <p:sp>
         <p:nvSpPr>
-          <p:cNvPr id="24" name="Shape 24"/>
+          <p:cNvPr id="24" name="Google Shape;24;p5"/>
           <p:cNvSpPr txBox="1"/>
           <p:nvPr>
             <p:ph idx="12" type="sldNum"/>
@@ -3900,7 +3915,7 @@
             </a:lvl9pPr>
           </a:lstStyle>
           <a:p>
-            <a:pPr indent="0" lvl="0" marL="0">
+            <a:pPr indent="0" lvl="0" marL="0" rtl="0" algn="r">
               <a:spcBef>
                 <a:spcPts val="0"/>
               </a:spcBef>
@@ -3944,7 +3959,7 @@
       </p:grpSpPr>
       <p:sp>
         <p:nvSpPr>
-          <p:cNvPr id="26" name="Shape 26"/>
+          <p:cNvPr id="26" name="Google Shape;26;p6"/>
           <p:cNvSpPr txBox="1"/>
           <p:nvPr>
             <p:ph type="title"/>
@@ -4067,7 +4082,7 @@
       </p:sp>
       <p:sp>
         <p:nvSpPr>
-          <p:cNvPr id="27" name="Shape 27"/>
+          <p:cNvPr id="27" name="Google Shape;27;p6"/>
           <p:cNvSpPr txBox="1"/>
           <p:nvPr>
             <p:ph idx="12" type="sldNum"/>
@@ -4125,7 +4140,7 @@
             </a:lvl9pPr>
           </a:lstStyle>
           <a:p>
-            <a:pPr indent="0" lvl="0" marL="0">
+            <a:pPr indent="0" lvl="0" marL="0" rtl="0" algn="r">
               <a:spcBef>
                 <a:spcPts val="0"/>
               </a:spcBef>
@@ -4169,7 +4184,7 @@
       </p:grpSpPr>
       <p:sp>
         <p:nvSpPr>
-          <p:cNvPr id="29" name="Shape 29"/>
+          <p:cNvPr id="29" name="Google Shape;29;p7"/>
           <p:cNvSpPr txBox="1"/>
           <p:nvPr>
             <p:ph type="title"/>
@@ -4292,7 +4307,7 @@
       </p:sp>
       <p:sp>
         <p:nvSpPr>
-          <p:cNvPr id="30" name="Shape 30"/>
+          <p:cNvPr id="30" name="Google Shape;30;p7"/>
           <p:cNvSpPr txBox="1"/>
           <p:nvPr>
             <p:ph idx="1" type="body"/>
@@ -4415,7 +4430,7 @@
       </p:sp>
       <p:sp>
         <p:nvSpPr>
-          <p:cNvPr id="31" name="Shape 31"/>
+          <p:cNvPr id="31" name="Google Shape;31;p7"/>
           <p:cNvSpPr txBox="1"/>
           <p:nvPr>
             <p:ph idx="12" type="sldNum"/>
@@ -4473,7 +4488,7 @@
             </a:lvl9pPr>
           </a:lstStyle>
           <a:p>
-            <a:pPr indent="0" lvl="0" marL="0">
+            <a:pPr indent="0" lvl="0" marL="0" rtl="0" algn="r">
               <a:spcBef>
                 <a:spcPts val="0"/>
               </a:spcBef>
@@ -4517,7 +4532,7 @@
       </p:grpSpPr>
       <p:sp>
         <p:nvSpPr>
-          <p:cNvPr id="33" name="Shape 33"/>
+          <p:cNvPr id="33" name="Google Shape;33;p8"/>
           <p:cNvSpPr txBox="1"/>
           <p:nvPr>
             <p:ph type="title"/>
@@ -4640,7 +4655,7 @@
       </p:sp>
       <p:sp>
         <p:nvSpPr>
-          <p:cNvPr id="34" name="Shape 34"/>
+          <p:cNvPr id="34" name="Google Shape;34;p8"/>
           <p:cNvSpPr txBox="1"/>
           <p:nvPr>
             <p:ph idx="12" type="sldNum"/>
@@ -4698,7 +4713,7 @@
             </a:lvl9pPr>
           </a:lstStyle>
           <a:p>
-            <a:pPr indent="0" lvl="0" marL="0">
+            <a:pPr indent="0" lvl="0" marL="0" rtl="0" algn="r">
               <a:spcBef>
                 <a:spcPts val="0"/>
               </a:spcBef>
@@ -4742,7 +4757,7 @@
       </p:grpSpPr>
       <p:sp>
         <p:nvSpPr>
-          <p:cNvPr id="36" name="Shape 36"/>
+          <p:cNvPr id="36" name="Google Shape;36;p9"/>
           <p:cNvSpPr/>
           <p:nvPr/>
         </p:nvSpPr>
@@ -4767,7 +4782,7 @@
           </a:bodyPr>
           <a:lstStyle/>
           <a:p>
-            <a:pPr indent="0" lvl="0" marL="0">
+            <a:pPr indent="0" lvl="0" marL="0" rtl="0" algn="l">
               <a:spcBef>
                 <a:spcPts val="0"/>
               </a:spcBef>
@@ -4785,7 +4800,7 @@
       </p:sp>
       <p:sp>
         <p:nvSpPr>
-          <p:cNvPr id="37" name="Shape 37"/>
+          <p:cNvPr id="37" name="Google Shape;37;p9"/>
           <p:cNvSpPr txBox="1"/>
           <p:nvPr>
             <p:ph type="title"/>
@@ -4908,7 +4923,7 @@
       </p:sp>
       <p:sp>
         <p:nvSpPr>
-          <p:cNvPr id="38" name="Shape 38"/>
+          <p:cNvPr id="38" name="Google Shape;38;p9"/>
           <p:cNvSpPr txBox="1"/>
           <p:nvPr>
             <p:ph idx="1" type="subTitle"/>
@@ -5058,7 +5073,7 @@
       </p:sp>
       <p:sp>
         <p:nvSpPr>
-          <p:cNvPr id="39" name="Shape 39"/>
+          <p:cNvPr id="39" name="Google Shape;39;p9"/>
           <p:cNvSpPr txBox="1"/>
           <p:nvPr>
             <p:ph idx="2" type="body"/>
@@ -5181,7 +5196,7 @@
       </p:sp>
       <p:sp>
         <p:nvSpPr>
-          <p:cNvPr id="40" name="Shape 40"/>
+          <p:cNvPr id="40" name="Google Shape;40;p9"/>
           <p:cNvSpPr txBox="1"/>
           <p:nvPr>
             <p:ph idx="12" type="sldNum"/>
@@ -5239,7 +5254,7 @@
             </a:lvl9pPr>
           </a:lstStyle>
           <a:p>
-            <a:pPr indent="0" lvl="0" marL="0">
+            <a:pPr indent="0" lvl="0" marL="0" rtl="0" algn="r">
               <a:spcBef>
                 <a:spcPts val="0"/>
               </a:spcBef>
@@ -5283,7 +5298,7 @@
       </p:grpSpPr>
       <p:sp>
         <p:nvSpPr>
-          <p:cNvPr id="42" name="Shape 42"/>
+          <p:cNvPr id="42" name="Google Shape;42;p10"/>
           <p:cNvSpPr txBox="1"/>
           <p:nvPr>
             <p:ph idx="1" type="body"/>
@@ -5321,7 +5336,7 @@
       </p:sp>
       <p:sp>
         <p:nvSpPr>
-          <p:cNvPr id="43" name="Shape 43"/>
+          <p:cNvPr id="43" name="Google Shape;43;p10"/>
           <p:cNvSpPr txBox="1"/>
           <p:nvPr>
             <p:ph idx="12" type="sldNum"/>
@@ -5379,7 +5394,7 @@
             </a:lvl9pPr>
           </a:lstStyle>
           <a:p>
-            <a:pPr indent="0" lvl="0" marL="0">
+            <a:pPr indent="0" lvl="0" marL="0" rtl="0" algn="r">
               <a:spcBef>
                 <a:spcPts val="0"/>
               </a:spcBef>
@@ -5430,7 +5445,7 @@
       </p:grpSpPr>
       <p:sp>
         <p:nvSpPr>
-          <p:cNvPr id="6" name="Shape 6"/>
+          <p:cNvPr id="6" name="Google Shape;6;p1"/>
           <p:cNvSpPr txBox="1"/>
           <p:nvPr>
             <p:ph type="title"/>
@@ -5620,7 +5635,7 @@
       </p:sp>
       <p:sp>
         <p:nvSpPr>
-          <p:cNvPr id="7" name="Shape 7"/>
+          <p:cNvPr id="7" name="Google Shape;7;p1"/>
           <p:cNvSpPr txBox="1"/>
           <p:nvPr>
             <p:ph idx="1" type="body"/>
@@ -5837,7 +5852,7 @@
       </p:sp>
       <p:sp>
         <p:nvSpPr>
-          <p:cNvPr id="8" name="Shape 8"/>
+          <p:cNvPr id="8" name="Google Shape;8;p1"/>
           <p:cNvSpPr txBox="1"/>
           <p:nvPr>
             <p:ph idx="12" type="sldNum"/>
@@ -5935,7 +5950,7 @@
             </a:lvl9pPr>
           </a:lstStyle>
           <a:p>
-            <a:pPr indent="0" lvl="0" marL="0">
+            <a:pPr indent="0" lvl="0" marL="0" rtl="0" algn="r">
               <a:spcBef>
                 <a:spcPts val="0"/>
               </a:spcBef>
@@ -6680,7 +6695,7 @@
       </p:grpSpPr>
       <p:sp>
         <p:nvSpPr>
-          <p:cNvPr id="54" name="Shape 54"/>
+          <p:cNvPr id="54" name="Google Shape;54;p13"/>
           <p:cNvSpPr txBox="1"/>
           <p:nvPr>
             <p:ph type="ctrTitle"/>
@@ -6701,7 +6716,7 @@
           </a:bodyPr>
           <a:lstStyle/>
           <a:p>
-            <a:pPr indent="0" lvl="0" marL="0">
+            <a:pPr indent="0" lvl="0" marL="0" rtl="0" algn="ctr">
               <a:spcBef>
                 <a:spcPts val="0"/>
               </a:spcBef>
@@ -6720,7 +6735,7 @@
       </p:sp>
       <p:sp>
         <p:nvSpPr>
-          <p:cNvPr id="55" name="Shape 55"/>
+          <p:cNvPr id="55" name="Google Shape;55;p13"/>
           <p:cNvSpPr txBox="1"/>
           <p:nvPr>
             <p:ph idx="1" type="subTitle"/>
@@ -6741,7 +6756,7 @@
           </a:bodyPr>
           <a:lstStyle/>
           <a:p>
-            <a:pPr indent="0" lvl="0" marL="0">
+            <a:pPr indent="0" lvl="0" marL="0" rtl="0" algn="ctr">
               <a:spcBef>
                 <a:spcPts val="0"/>
               </a:spcBef>
@@ -6757,7 +6772,7 @@
             <a:endParaRPr/>
           </a:p>
           <a:p>
-            <a:pPr indent="0" lvl="0" marL="0">
+            <a:pPr indent="0" lvl="0" marL="0" rtl="0" algn="ctr">
               <a:spcBef>
                 <a:spcPts val="0"/>
               </a:spcBef>
@@ -6801,7 +6816,7 @@
       </p:grpSpPr>
       <p:sp>
         <p:nvSpPr>
-          <p:cNvPr id="104" name="Shape 104"/>
+          <p:cNvPr id="104" name="Google Shape;104;p22"/>
           <p:cNvSpPr txBox="1"/>
           <p:nvPr/>
         </p:nvSpPr>
@@ -6824,7 +6839,7 @@
           </a:bodyPr>
           <a:lstStyle/>
           <a:p>
-            <a:pPr indent="0" lvl="0" marL="0">
+            <a:pPr indent="0" lvl="0" marL="0" rtl="0" algn="l">
               <a:spcBef>
                 <a:spcPts val="0"/>
               </a:spcBef>
@@ -6842,7 +6857,7 @@
       </p:sp>
       <p:sp>
         <p:nvSpPr>
-          <p:cNvPr id="105" name="Shape 105"/>
+          <p:cNvPr id="105" name="Google Shape;105;p22"/>
           <p:cNvSpPr txBox="1"/>
           <p:nvPr/>
         </p:nvSpPr>
@@ -6865,7 +6880,7 @@
           </a:bodyPr>
           <a:lstStyle/>
           <a:p>
-            <a:pPr indent="0" lvl="0" marL="0" rtl="0">
+            <a:pPr indent="0" lvl="0" marL="0" rtl="0" algn="l">
               <a:spcBef>
                 <a:spcPts val="0"/>
               </a:spcBef>
@@ -6884,7 +6899,7 @@
       </p:sp>
       <p:sp>
         <p:nvSpPr>
-          <p:cNvPr id="106" name="Shape 106"/>
+          <p:cNvPr id="106" name="Google Shape;106;p22"/>
           <p:cNvSpPr txBox="1"/>
           <p:nvPr/>
         </p:nvSpPr>
@@ -6907,7 +6922,7 @@
           </a:bodyPr>
           <a:lstStyle/>
           <a:p>
-            <a:pPr indent="0" lvl="0" marL="0">
+            <a:pPr indent="0" lvl="0" marL="0" rtl="0" algn="l">
               <a:spcBef>
                 <a:spcPts val="0"/>
               </a:spcBef>
@@ -6923,7 +6938,7 @@
             <a:endParaRPr sz="1800" u="sng"/>
           </a:p>
           <a:p>
-            <a:pPr indent="0" lvl="0" marL="0">
+            <a:pPr indent="0" lvl="0" marL="0" rtl="0" algn="l">
               <a:spcBef>
                 <a:spcPts val="0"/>
               </a:spcBef>
@@ -6938,7 +6953,7 @@
             <a:endParaRPr sz="1800"/>
           </a:p>
           <a:p>
-            <a:pPr indent="-342900" lvl="0" marL="457200" rtl="0">
+            <a:pPr indent="-342900" lvl="0" marL="457200" rtl="0" algn="l">
               <a:lnSpc>
                 <a:spcPct val="115000"/>
               </a:lnSpc>
@@ -6958,7 +6973,7 @@
             <a:endParaRPr sz="1800"/>
           </a:p>
           <a:p>
-            <a:pPr indent="-342900" lvl="1" marL="914400" rtl="0">
+            <a:pPr indent="-342900" lvl="1" marL="914400" rtl="0" algn="l">
               <a:lnSpc>
                 <a:spcPct val="115000"/>
               </a:lnSpc>
@@ -6978,7 +6993,7 @@
             <a:endParaRPr sz="1800"/>
           </a:p>
           <a:p>
-            <a:pPr indent="-342900" lvl="0" marL="457200" rtl="0">
+            <a:pPr indent="-342900" lvl="0" marL="457200" rtl="0" algn="l">
               <a:lnSpc>
                 <a:spcPct val="115000"/>
               </a:lnSpc>
@@ -6998,7 +7013,7 @@
             <a:endParaRPr sz="1800"/>
           </a:p>
           <a:p>
-            <a:pPr indent="-342900" lvl="0" marL="457200" rtl="0">
+            <a:pPr indent="-342900" lvl="0" marL="457200" rtl="0" algn="l">
               <a:lnSpc>
                 <a:spcPct val="115000"/>
               </a:lnSpc>
@@ -7018,7 +7033,7 @@
             <a:endParaRPr sz="1800"/>
           </a:p>
           <a:p>
-            <a:pPr indent="-342900" lvl="0" marL="457200" rtl="0">
+            <a:pPr indent="-342900" lvl="0" marL="457200" rtl="0" algn="l">
               <a:lnSpc>
                 <a:spcPct val="115000"/>
               </a:lnSpc>
@@ -7038,7 +7053,7 @@
             <a:endParaRPr sz="1800"/>
           </a:p>
           <a:p>
-            <a:pPr indent="-342900" lvl="1" marL="914400">
+            <a:pPr indent="-342900" lvl="1" marL="914400" rtl="0" algn="l">
               <a:lnSpc>
                 <a:spcPct val="115000"/>
               </a:lnSpc>
@@ -7086,7 +7101,7 @@
       </p:grpSpPr>
       <p:sp>
         <p:nvSpPr>
-          <p:cNvPr id="111" name="Shape 111"/>
+          <p:cNvPr id="111" name="Google Shape;111;p23"/>
           <p:cNvSpPr txBox="1"/>
           <p:nvPr>
             <p:ph idx="1" type="body"/>
@@ -7107,7 +7122,7 @@
           </a:bodyPr>
           <a:lstStyle/>
           <a:p>
-            <a:pPr indent="-342900" lvl="0" marL="457200" rtl="0">
+            <a:pPr indent="-342900" lvl="0" marL="457200" rtl="0" algn="l">
               <a:spcBef>
                 <a:spcPts val="0"/>
               </a:spcBef>
@@ -7144,7 +7159,7 @@
             </a:endParaRPr>
           </a:p>
           <a:p>
-            <a:pPr indent="-342900" lvl="0" marL="457200" rtl="0">
+            <a:pPr indent="-342900" lvl="0" marL="457200" rtl="0" algn="l">
               <a:spcBef>
                 <a:spcPts val="0"/>
               </a:spcBef>
@@ -7181,7 +7196,7 @@
             </a:endParaRPr>
           </a:p>
           <a:p>
-            <a:pPr indent="-342900" lvl="0" marL="457200" rtl="0">
+            <a:pPr indent="-342900" lvl="0" marL="457200" rtl="0" algn="l">
               <a:spcBef>
                 <a:spcPts val="0"/>
               </a:spcBef>
@@ -7218,7 +7233,7 @@
             </a:endParaRPr>
           </a:p>
           <a:p>
-            <a:pPr indent="-342900" lvl="0" marL="457200" rtl="0">
+            <a:pPr indent="-342900" lvl="0" marL="457200" rtl="0" algn="l">
               <a:spcBef>
                 <a:spcPts val="0"/>
               </a:spcBef>
@@ -7255,7 +7270,7 @@
             </a:endParaRPr>
           </a:p>
           <a:p>
-            <a:pPr indent="0" lvl="0" marL="0" rtl="0">
+            <a:pPr indent="0" lvl="0" marL="0" rtl="0" algn="l">
               <a:spcBef>
                 <a:spcPts val="0"/>
               </a:spcBef>
@@ -7277,7 +7292,7 @@
       </p:sp>
       <p:sp>
         <p:nvSpPr>
-          <p:cNvPr id="112" name="Shape 112"/>
+          <p:cNvPr id="112" name="Google Shape;112;p23"/>
           <p:cNvSpPr txBox="1"/>
           <p:nvPr/>
         </p:nvSpPr>
@@ -7300,7 +7315,7 @@
           </a:bodyPr>
           <a:lstStyle/>
           <a:p>
-            <a:pPr indent="0" lvl="0" marL="0" rtl="0">
+            <a:pPr indent="0" lvl="0" marL="0" rtl="0" algn="l">
               <a:spcBef>
                 <a:spcPts val="0"/>
               </a:spcBef>
@@ -7344,7 +7359,7 @@
       </p:grpSpPr>
       <p:sp>
         <p:nvSpPr>
-          <p:cNvPr id="117" name="Shape 117"/>
+          <p:cNvPr id="117" name="Google Shape;117;p24"/>
           <p:cNvSpPr txBox="1"/>
           <p:nvPr>
             <p:ph idx="1" type="body"/>
@@ -7365,7 +7380,7 @@
           </a:bodyPr>
           <a:lstStyle/>
           <a:p>
-            <a:pPr indent="-342900" lvl="0" marL="457200" rtl="0">
+            <a:pPr indent="-342900" lvl="0" marL="457200" rtl="0" algn="l">
               <a:spcBef>
                 <a:spcPts val="0"/>
               </a:spcBef>
@@ -7393,7 +7408,7 @@
             </a:endParaRPr>
           </a:p>
           <a:p>
-            <a:pPr indent="-342900" lvl="1" marL="914400" rtl="0">
+            <a:pPr indent="-342900" lvl="1" marL="914400" rtl="0" algn="l">
               <a:spcBef>
                 <a:spcPts val="0"/>
               </a:spcBef>
@@ -7421,7 +7436,7 @@
             </a:endParaRPr>
           </a:p>
           <a:p>
-            <a:pPr indent="-342900" lvl="1" marL="914400" rtl="0">
+            <a:pPr indent="-342900" lvl="1" marL="914400" rtl="0" algn="l">
               <a:spcBef>
                 <a:spcPts val="0"/>
               </a:spcBef>
@@ -7449,7 +7464,7 @@
             </a:endParaRPr>
           </a:p>
           <a:p>
-            <a:pPr indent="-342900" lvl="1" marL="914400" rtl="0">
+            <a:pPr indent="-342900" lvl="1" marL="914400" rtl="0" algn="l">
               <a:spcBef>
                 <a:spcPts val="0"/>
               </a:spcBef>
@@ -7477,7 +7492,7 @@
             </a:endParaRPr>
           </a:p>
           <a:p>
-            <a:pPr indent="-342900" lvl="1" marL="914400" rtl="0">
+            <a:pPr indent="-342900" lvl="1" marL="914400" rtl="0" algn="l">
               <a:spcBef>
                 <a:spcPts val="0"/>
               </a:spcBef>
@@ -7505,7 +7520,7 @@
             </a:endParaRPr>
           </a:p>
           <a:p>
-            <a:pPr indent="-342900" lvl="1" marL="914400" rtl="0">
+            <a:pPr indent="-342900" lvl="1" marL="914400" rtl="0" algn="l">
               <a:spcBef>
                 <a:spcPts val="0"/>
               </a:spcBef>
@@ -7533,7 +7548,7 @@
             </a:endParaRPr>
           </a:p>
           <a:p>
-            <a:pPr indent="-342900" lvl="1" marL="914400" rtl="0">
+            <a:pPr indent="-342900" lvl="1" marL="914400" rtl="0" algn="l">
               <a:spcBef>
                 <a:spcPts val="0"/>
               </a:spcBef>
@@ -7561,7 +7576,7 @@
             </a:endParaRPr>
           </a:p>
           <a:p>
-            <a:pPr indent="0" lvl="0" marL="457200" rtl="0">
+            <a:pPr indent="0" lvl="0" marL="457200" rtl="0" algn="l">
               <a:spcBef>
                 <a:spcPts val="0"/>
               </a:spcBef>
@@ -7585,7 +7600,7 @@
             </a:endParaRPr>
           </a:p>
           <a:p>
-            <a:pPr indent="0" lvl="0" marL="0">
+            <a:pPr indent="0" lvl="0" marL="0" rtl="0" algn="l">
               <a:spcBef>
                 <a:spcPts val="0"/>
               </a:spcBef>
@@ -7609,7 +7624,7 @@
             </a:endParaRPr>
           </a:p>
           <a:p>
-            <a:pPr indent="0" lvl="0" marL="0">
+            <a:pPr indent="0" lvl="0" marL="0" rtl="0" algn="l">
               <a:spcBef>
                 <a:spcPts val="1600"/>
               </a:spcBef>
@@ -7627,7 +7642,7 @@
       </p:sp>
       <p:sp>
         <p:nvSpPr>
-          <p:cNvPr id="118" name="Shape 118"/>
+          <p:cNvPr id="118" name="Google Shape;118;p24"/>
           <p:cNvSpPr txBox="1"/>
           <p:nvPr/>
         </p:nvSpPr>
@@ -7650,7 +7665,7 @@
           </a:bodyPr>
           <a:lstStyle/>
           <a:p>
-            <a:pPr indent="0" lvl="0" marL="0" rtl="0">
+            <a:pPr indent="0" lvl="0" marL="0" rtl="0" algn="l">
               <a:spcBef>
                 <a:spcPts val="0"/>
               </a:spcBef>
@@ -7694,7 +7709,7 @@
       </p:grpSpPr>
       <p:sp>
         <p:nvSpPr>
-          <p:cNvPr id="123" name="Shape 123"/>
+          <p:cNvPr id="123" name="Google Shape;123;p25"/>
           <p:cNvSpPr txBox="1"/>
           <p:nvPr>
             <p:ph idx="1" type="body"/>
@@ -7715,7 +7730,7 @@
           </a:bodyPr>
           <a:lstStyle/>
           <a:p>
-            <a:pPr indent="-342900" lvl="0" marL="457200" rtl="0">
+            <a:pPr indent="-342900" lvl="0" marL="457200" rtl="0" algn="l">
               <a:spcBef>
                 <a:spcPts val="0"/>
               </a:spcBef>
@@ -7743,7 +7758,7 @@
             </a:endParaRPr>
           </a:p>
           <a:p>
-            <a:pPr indent="-342900" lvl="0" marL="457200" rtl="0">
+            <a:pPr indent="-342900" lvl="0" marL="457200" rtl="0" algn="l">
               <a:spcBef>
                 <a:spcPts val="0"/>
               </a:spcBef>
@@ -7771,7 +7786,7 @@
             </a:endParaRPr>
           </a:p>
           <a:p>
-            <a:pPr indent="0" lvl="0" marL="0">
+            <a:pPr indent="0" lvl="0" marL="0" rtl="0" algn="l">
               <a:spcBef>
                 <a:spcPts val="0"/>
               </a:spcBef>
@@ -7789,7 +7804,7 @@
       </p:sp>
       <p:sp>
         <p:nvSpPr>
-          <p:cNvPr id="124" name="Shape 124"/>
+          <p:cNvPr id="124" name="Google Shape;124;p25"/>
           <p:cNvSpPr txBox="1"/>
           <p:nvPr/>
         </p:nvSpPr>
@@ -7812,7 +7827,7 @@
           </a:bodyPr>
           <a:lstStyle/>
           <a:p>
-            <a:pPr indent="0" lvl="0" marL="0" rtl="0">
+            <a:pPr indent="0" lvl="0" marL="0" rtl="0" algn="l">
               <a:spcBef>
                 <a:spcPts val="0"/>
               </a:spcBef>
@@ -7856,7 +7871,7 @@
       </p:grpSpPr>
       <p:sp>
         <p:nvSpPr>
-          <p:cNvPr id="129" name="Shape 129"/>
+          <p:cNvPr id="129" name="Google Shape;129;p26"/>
           <p:cNvSpPr txBox="1"/>
           <p:nvPr>
             <p:ph type="title"/>
@@ -7877,7 +7892,7 @@
           </a:bodyPr>
           <a:lstStyle/>
           <a:p>
-            <a:pPr indent="0" lvl="0" marL="0" rtl="0">
+            <a:pPr indent="0" lvl="0" marL="0" rtl="0" algn="l">
               <a:lnSpc>
                 <a:spcPct val="115000"/>
               </a:lnSpc>
@@ -7942,7 +7957,7 @@
       </p:grpSpPr>
       <p:sp>
         <p:nvSpPr>
-          <p:cNvPr id="60" name="Shape 60"/>
+          <p:cNvPr id="60" name="Google Shape;60;p14"/>
           <p:cNvSpPr txBox="1"/>
           <p:nvPr>
             <p:ph type="title"/>
@@ -7963,7 +7978,7 @@
           </a:bodyPr>
           <a:lstStyle/>
           <a:p>
-            <a:pPr indent="-342900" lvl="0" marL="457200" rtl="0">
+            <a:pPr indent="-342900" lvl="0" marL="457200" rtl="0" algn="l">
               <a:spcBef>
                 <a:spcPts val="0"/>
               </a:spcBef>
@@ -7980,7 +7995,7 @@
             <a:endParaRPr sz="1800"/>
           </a:p>
           <a:p>
-            <a:pPr indent="0" lvl="0" marL="0" rtl="0">
+            <a:pPr indent="0" lvl="0" marL="0" rtl="0" algn="l">
               <a:spcBef>
                 <a:spcPts val="0"/>
               </a:spcBef>
@@ -7995,7 +8010,7 @@
             <a:endParaRPr sz="1800"/>
           </a:p>
           <a:p>
-            <a:pPr indent="-342900" lvl="0" marL="457200" rtl="0">
+            <a:pPr indent="-342900" lvl="0" marL="457200" rtl="0" algn="l">
               <a:spcBef>
                 <a:spcPts val="0"/>
               </a:spcBef>
@@ -8012,7 +8027,7 @@
             <a:endParaRPr sz="1800"/>
           </a:p>
           <a:p>
-            <a:pPr indent="0" lvl="0" marL="0" rtl="0">
+            <a:pPr indent="0" lvl="0" marL="0" rtl="0" algn="l">
               <a:spcBef>
                 <a:spcPts val="0"/>
               </a:spcBef>
@@ -8027,7 +8042,7 @@
             <a:endParaRPr sz="1800"/>
           </a:p>
           <a:p>
-            <a:pPr indent="-342900" lvl="0" marL="457200" rtl="0">
+            <a:pPr indent="-342900" lvl="0" marL="457200" rtl="0" algn="l">
               <a:spcBef>
                 <a:spcPts val="0"/>
               </a:spcBef>
@@ -8044,7 +8059,7 @@
             <a:endParaRPr sz="1800"/>
           </a:p>
           <a:p>
-            <a:pPr indent="0" lvl="0" marL="0" rtl="0">
+            <a:pPr indent="0" lvl="0" marL="0" rtl="0" algn="l">
               <a:spcBef>
                 <a:spcPts val="0"/>
               </a:spcBef>
@@ -8059,7 +8074,7 @@
             <a:endParaRPr sz="1800"/>
           </a:p>
           <a:p>
-            <a:pPr indent="-342900" lvl="0" marL="457200" rtl="0">
+            <a:pPr indent="-342900" lvl="0" marL="457200" rtl="0" algn="l">
               <a:spcBef>
                 <a:spcPts val="0"/>
               </a:spcBef>
@@ -8079,7 +8094,7 @@
       </p:sp>
       <p:sp>
         <p:nvSpPr>
-          <p:cNvPr id="61" name="Shape 61"/>
+          <p:cNvPr id="61" name="Google Shape;61;p14"/>
           <p:cNvSpPr txBox="1"/>
           <p:nvPr/>
         </p:nvSpPr>
@@ -8102,7 +8117,7 @@
           </a:bodyPr>
           <a:lstStyle/>
           <a:p>
-            <a:pPr indent="0" lvl="0" marL="0">
+            <a:pPr indent="0" lvl="0" marL="0" rtl="0" algn="l">
               <a:spcBef>
                 <a:spcPts val="0"/>
               </a:spcBef>
@@ -8146,7 +8161,7 @@
       </p:grpSpPr>
       <p:sp>
         <p:nvSpPr>
-          <p:cNvPr id="66" name="Shape 66"/>
+          <p:cNvPr id="66" name="Google Shape;66;p15"/>
           <p:cNvSpPr txBox="1"/>
           <p:nvPr>
             <p:ph type="title"/>
@@ -8167,7 +8182,7 @@
           </a:bodyPr>
           <a:lstStyle/>
           <a:p>
-            <a:pPr indent="0" lvl="0" marL="0" algn="l">
+            <a:pPr indent="0" lvl="0" marL="0" rtl="0" algn="l">
               <a:spcBef>
                 <a:spcPts val="0"/>
               </a:spcBef>
@@ -8186,7 +8201,7 @@
       </p:sp>
       <p:sp>
         <p:nvSpPr>
-          <p:cNvPr id="67" name="Shape 67"/>
+          <p:cNvPr id="67" name="Google Shape;67;p15"/>
           <p:cNvSpPr txBox="1"/>
           <p:nvPr/>
         </p:nvSpPr>
@@ -8209,7 +8224,7 @@
           </a:bodyPr>
           <a:lstStyle/>
           <a:p>
-            <a:pPr indent="0" lvl="0" marL="0">
+            <a:pPr indent="0" lvl="0" marL="0" rtl="0" algn="l">
               <a:spcBef>
                 <a:spcPts val="0"/>
               </a:spcBef>
@@ -8225,7 +8240,7 @@
             <a:endParaRPr b="1"/>
           </a:p>
           <a:p>
-            <a:pPr indent="-317500" lvl="0" marL="457200" rtl="0">
+            <a:pPr indent="-317500" lvl="0" marL="457200" rtl="0" algn="l">
               <a:spcBef>
                 <a:spcPts val="0"/>
               </a:spcBef>
@@ -8242,7 +8257,7 @@
             <a:endParaRPr/>
           </a:p>
           <a:p>
-            <a:pPr indent="-317500" lvl="1" marL="914400" rtl="0">
+            <a:pPr indent="-317500" lvl="1" marL="914400" rtl="0" algn="l">
               <a:spcBef>
                 <a:spcPts val="0"/>
               </a:spcBef>
@@ -8259,7 +8274,7 @@
             <a:endParaRPr/>
           </a:p>
           <a:p>
-            <a:pPr indent="-317500" lvl="1" marL="914400" rtl="0">
+            <a:pPr indent="-317500" lvl="1" marL="914400" rtl="0" algn="l">
               <a:spcBef>
                 <a:spcPts val="0"/>
               </a:spcBef>
@@ -8276,7 +8291,7 @@
             <a:endParaRPr/>
           </a:p>
           <a:p>
-            <a:pPr indent="-317500" lvl="0" marL="457200" rtl="0">
+            <a:pPr indent="-317500" lvl="0" marL="457200" rtl="0" algn="l">
               <a:spcBef>
                 <a:spcPts val="0"/>
               </a:spcBef>
@@ -8293,7 +8308,7 @@
             <a:endParaRPr/>
           </a:p>
           <a:p>
-            <a:pPr indent="-317500" lvl="1" marL="914400" rtl="0">
+            <a:pPr indent="-317500" lvl="1" marL="914400" rtl="0" algn="l">
               <a:spcBef>
                 <a:spcPts val="0"/>
               </a:spcBef>
@@ -8310,7 +8325,7 @@
             <a:endParaRPr/>
           </a:p>
           <a:p>
-            <a:pPr indent="-317500" lvl="1" marL="914400" rtl="0">
+            <a:pPr indent="-317500" lvl="1" marL="914400" rtl="0" algn="l">
               <a:spcBef>
                 <a:spcPts val="0"/>
               </a:spcBef>
@@ -8327,7 +8342,7 @@
             <a:endParaRPr/>
           </a:p>
           <a:p>
-            <a:pPr indent="-317500" lvl="1" marL="914400" rtl="0">
+            <a:pPr indent="-317500" lvl="1" marL="914400" rtl="0" algn="l">
               <a:spcBef>
                 <a:spcPts val="0"/>
               </a:spcBef>
@@ -8344,7 +8359,7 @@
             <a:endParaRPr/>
           </a:p>
           <a:p>
-            <a:pPr indent="-317500" lvl="1" marL="914400" rtl="0">
+            <a:pPr indent="-317500" lvl="1" marL="914400" rtl="0" algn="l">
               <a:spcBef>
                 <a:spcPts val="0"/>
               </a:spcBef>
@@ -8361,7 +8376,7 @@
             <a:endParaRPr/>
           </a:p>
           <a:p>
-            <a:pPr indent="-317500" lvl="0" marL="457200" rtl="0">
+            <a:pPr indent="-317500" lvl="0" marL="457200" rtl="0" algn="l">
               <a:spcBef>
                 <a:spcPts val="0"/>
               </a:spcBef>
@@ -8378,7 +8393,7 @@
             <a:endParaRPr/>
           </a:p>
           <a:p>
-            <a:pPr indent="-317500" lvl="1" marL="914400" rtl="0">
+            <a:pPr indent="-317500" lvl="1" marL="914400" rtl="0" algn="l">
               <a:spcBef>
                 <a:spcPts val="0"/>
               </a:spcBef>
@@ -8395,7 +8410,7 @@
             <a:endParaRPr/>
           </a:p>
           <a:p>
-            <a:pPr indent="-317500" lvl="1" marL="914400" rtl="0">
+            <a:pPr indent="-317500" lvl="1" marL="914400" rtl="0" algn="l">
               <a:spcBef>
                 <a:spcPts val="0"/>
               </a:spcBef>
@@ -8412,7 +8427,7 @@
             <a:endParaRPr/>
           </a:p>
           <a:p>
-            <a:pPr indent="-317500" lvl="1" marL="914400" rtl="0">
+            <a:pPr indent="-317500" lvl="1" marL="914400" rtl="0" algn="l">
               <a:spcBef>
                 <a:spcPts val="0"/>
               </a:spcBef>
@@ -8429,7 +8444,7 @@
             <a:endParaRPr/>
           </a:p>
           <a:p>
-            <a:pPr indent="-317500" lvl="1" marL="914400" rtl="0">
+            <a:pPr indent="-317500" lvl="1" marL="914400" rtl="0" algn="l">
               <a:spcBef>
                 <a:spcPts val="0"/>
               </a:spcBef>
@@ -8446,7 +8461,7 @@
             <a:endParaRPr/>
           </a:p>
           <a:p>
-            <a:pPr indent="-317500" lvl="1" marL="914400">
+            <a:pPr indent="-317500" lvl="1" marL="914400" rtl="0" algn="l">
               <a:spcBef>
                 <a:spcPts val="0"/>
               </a:spcBef>
@@ -8466,7 +8481,7 @@
       </p:sp>
       <p:sp>
         <p:nvSpPr>
-          <p:cNvPr id="68" name="Shape 68"/>
+          <p:cNvPr id="68" name="Google Shape;68;p15"/>
           <p:cNvSpPr txBox="1"/>
           <p:nvPr/>
         </p:nvSpPr>
@@ -8489,7 +8504,7 @@
           </a:bodyPr>
           <a:lstStyle/>
           <a:p>
-            <a:pPr indent="0" lvl="0" marL="0">
+            <a:pPr indent="0" lvl="0" marL="0" rtl="0" algn="l">
               <a:spcBef>
                 <a:spcPts val="0"/>
               </a:spcBef>
@@ -8507,7 +8522,7 @@
       </p:sp>
       <p:sp>
         <p:nvSpPr>
-          <p:cNvPr id="69" name="Shape 69"/>
+          <p:cNvPr id="69" name="Google Shape;69;p15"/>
           <p:cNvSpPr txBox="1"/>
           <p:nvPr/>
         </p:nvSpPr>
@@ -8530,7 +8545,7 @@
           </a:bodyPr>
           <a:lstStyle/>
           <a:p>
-            <a:pPr indent="0" lvl="0" marL="0">
+            <a:pPr indent="0" lvl="0" marL="0" rtl="0" algn="l">
               <a:spcBef>
                 <a:spcPts val="0"/>
               </a:spcBef>
@@ -8546,7 +8561,7 @@
             <a:endParaRPr b="1"/>
           </a:p>
           <a:p>
-            <a:pPr indent="-317500" lvl="0" marL="457200" rtl="0">
+            <a:pPr indent="-317500" lvl="0" marL="457200" rtl="0" algn="l">
               <a:spcBef>
                 <a:spcPts val="0"/>
               </a:spcBef>
@@ -8563,7 +8578,7 @@
             <a:endParaRPr/>
           </a:p>
           <a:p>
-            <a:pPr indent="-317500" lvl="1" marL="914400" rtl="0">
+            <a:pPr indent="-317500" lvl="1" marL="914400" rtl="0" algn="l">
               <a:spcBef>
                 <a:spcPts val="0"/>
               </a:spcBef>
@@ -8580,7 +8595,7 @@
             <a:endParaRPr/>
           </a:p>
           <a:p>
-            <a:pPr indent="-317500" lvl="1" marL="914400" rtl="0">
+            <a:pPr indent="-317500" lvl="1" marL="914400" rtl="0" algn="l">
               <a:spcBef>
                 <a:spcPts val="0"/>
               </a:spcBef>
@@ -8597,7 +8612,7 @@
             <a:endParaRPr/>
           </a:p>
           <a:p>
-            <a:pPr indent="-317500" lvl="1" marL="914400" rtl="0">
+            <a:pPr indent="-317500" lvl="1" marL="914400" rtl="0" algn="l">
               <a:spcBef>
                 <a:spcPts val="0"/>
               </a:spcBef>
@@ -8614,7 +8629,7 @@
             <a:endParaRPr/>
           </a:p>
           <a:p>
-            <a:pPr indent="-317500" lvl="1" marL="914400" rtl="0">
+            <a:pPr indent="-317500" lvl="1" marL="914400" rtl="0" algn="l">
               <a:spcBef>
                 <a:spcPts val="0"/>
               </a:spcBef>
@@ -8631,7 +8646,7 @@
             <a:endParaRPr/>
           </a:p>
           <a:p>
-            <a:pPr indent="-317500" lvl="0" marL="457200" rtl="0">
+            <a:pPr indent="-317500" lvl="0" marL="457200" rtl="0" algn="l">
               <a:spcBef>
                 <a:spcPts val="0"/>
               </a:spcBef>
@@ -8648,7 +8663,7 @@
             <a:endParaRPr/>
           </a:p>
           <a:p>
-            <a:pPr indent="-317500" lvl="1" marL="914400" rtl="0">
+            <a:pPr indent="-317500" lvl="1" marL="914400" rtl="0" algn="l">
               <a:spcBef>
                 <a:spcPts val="0"/>
               </a:spcBef>
@@ -8665,7 +8680,7 @@
             <a:endParaRPr/>
           </a:p>
           <a:p>
-            <a:pPr indent="-317500" lvl="1" marL="914400" rtl="0">
+            <a:pPr indent="-317500" lvl="1" marL="914400" rtl="0" algn="l">
               <a:spcBef>
                 <a:spcPts val="0"/>
               </a:spcBef>
@@ -8682,7 +8697,7 @@
             <a:endParaRPr/>
           </a:p>
           <a:p>
-            <a:pPr indent="-317500" lvl="1" marL="914400" rtl="0">
+            <a:pPr indent="-317500" lvl="1" marL="914400" rtl="0" algn="l">
               <a:spcBef>
                 <a:spcPts val="0"/>
               </a:spcBef>
@@ -8699,7 +8714,7 @@
             <a:endParaRPr/>
           </a:p>
           <a:p>
-            <a:pPr indent="-317500" lvl="0" marL="457200" rtl="0">
+            <a:pPr indent="-317500" lvl="0" marL="457200" rtl="0" algn="l">
               <a:spcBef>
                 <a:spcPts val="0"/>
               </a:spcBef>
@@ -8716,7 +8731,7 @@
             <a:endParaRPr/>
           </a:p>
           <a:p>
-            <a:pPr indent="-317500" lvl="1" marL="914400">
+            <a:pPr indent="-317500" lvl="1" marL="914400" rtl="0" algn="l">
               <a:spcBef>
                 <a:spcPts val="0"/>
               </a:spcBef>
@@ -8761,7 +8776,7 @@
       </p:grpSpPr>
       <p:pic>
         <p:nvPicPr>
-          <p:cNvPr id="74" name="Shape 74"/>
+          <p:cNvPr id="74" name="Google Shape;74;p16"/>
           <p:cNvPicPr preferRelativeResize="0"/>
           <p:nvPr/>
         </p:nvPicPr>
@@ -8814,7 +8829,7 @@
       </p:grpSpPr>
       <p:pic>
         <p:nvPicPr>
-          <p:cNvPr id="79" name="Shape 79"/>
+          <p:cNvPr id="79" name="Google Shape;79;p17"/>
           <p:cNvPicPr preferRelativeResize="0"/>
           <p:nvPr/>
         </p:nvPicPr>
@@ -8867,7 +8882,7 @@
       </p:grpSpPr>
       <p:pic>
         <p:nvPicPr>
-          <p:cNvPr id="84" name="Shape 84"/>
+          <p:cNvPr id="84" name="Google Shape;84;p18"/>
           <p:cNvPicPr preferRelativeResize="0"/>
           <p:nvPr/>
         </p:nvPicPr>
@@ -8920,7 +8935,7 @@
       </p:grpSpPr>
       <p:pic>
         <p:nvPicPr>
-          <p:cNvPr id="89" name="Shape 89"/>
+          <p:cNvPr id="89" name="Google Shape;89;p19"/>
           <p:cNvPicPr preferRelativeResize="0"/>
           <p:nvPr/>
         </p:nvPicPr>
@@ -8973,7 +8988,7 @@
       </p:grpSpPr>
       <p:pic>
         <p:nvPicPr>
-          <p:cNvPr id="94" name="Shape 94"/>
+          <p:cNvPr id="94" name="Google Shape;94;p20"/>
           <p:cNvPicPr preferRelativeResize="0"/>
           <p:nvPr/>
         </p:nvPicPr>
@@ -9026,7 +9041,7 @@
       </p:grpSpPr>
       <p:pic>
         <p:nvPicPr>
-          <p:cNvPr id="99" name="Shape 99"/>
+          <p:cNvPr id="99" name="Google Shape;99;p21"/>
           <p:cNvPicPr preferRelativeResize="0"/>
           <p:nvPr/>
         </p:nvPicPr>

</xml_diff>